<commit_message>
Full Portfolio Analysis attached
</commit_message>
<xml_diff>
--- a/data/Storylines in Portfolios.pptx
+++ b/data/Storylines in Portfolios.pptx
@@ -6,6 +6,8 @@
   </p:sldMasterIdLst>
   <p:sldIdLst>
     <p:sldId id="258" r:id="rId2"/>
+    <p:sldId id="260" r:id="rId3"/>
+    <p:sldId id="259" r:id="rId4"/>
   </p:sldIdLst>
   <p:sldSz cx="12192000" cy="6858000"/>
   <p:notesSz cx="6858000" cy="9144000"/>
@@ -3367,30 +3369,38 @@
         </p:nvSpPr>
         <p:spPr/>
         <p:txBody>
-          <a:bodyPr/>
+          <a:bodyPr>
+            <a:normAutofit/>
+          </a:bodyPr>
           <a:lstStyle/>
           <a:p>
             <a:r>
               <a:rPr lang="en-US" dirty="0"/>
-              <a:t>Current Projects (Baseline)</a:t>
+              <a:t>[x] Current Projects (Baseline)</a:t>
             </a:r>
           </a:p>
           <a:p>
             <a:r>
               <a:rPr lang="en-US" dirty="0"/>
-              <a:t>Proportional Portfolio (SJV does its part in the State’s agenda)</a:t>
+              <a:t>[x] Proportional Portfolio (SJV does its part in the State’s agenda)</a:t>
             </a:r>
           </a:p>
           <a:p>
             <a:r>
               <a:rPr lang="en-US" dirty="0"/>
-              <a:t>Max Bioenergy </a:t>
+              <a:t>[x] 1.5x proportional, 0.5x (modest) proportional</a:t>
             </a:r>
           </a:p>
           <a:p>
             <a:r>
               <a:rPr lang="en-US" dirty="0"/>
-              <a:t>Max Land for Wind/Solar for electricity and hydrogen</a:t>
+              <a:t>[x] Amplify Max Bioenergy </a:t>
+            </a:r>
+          </a:p>
+          <a:p>
+            <a:r>
+              <a:rPr lang="en-US" dirty="0"/>
+              <a:t>[x]Max Land for Wind/Solar for electricity and hydrogen</a:t>
             </a:r>
           </a:p>
           <a:p>
@@ -3403,13 +3413,8 @@
             <a:pPr lvl="1"/>
             <a:r>
               <a:rPr lang="en-US" dirty="0"/>
-              <a:t>Variant on </a:t>
-            </a:r>
-            <a:r>
-              <a:rPr lang="en-US" dirty="0" err="1"/>
-              <a:t>propotional</a:t>
-            </a:r>
-            <a:endParaRPr lang="en-US" dirty="0"/>
+              <a:t>Variant on proportional (expected)</a:t>
+            </a:r>
           </a:p>
           <a:p>
             <a:pPr lvl="1"/>
@@ -3424,9 +3429,6 @@
               <a:rPr lang="en-US" dirty="0"/>
               <a:t>Modest proposal</a:t>
             </a:r>
-          </a:p>
-          <a:p>
-            <a:endParaRPr lang="en-US" dirty="0"/>
           </a:p>
         </p:txBody>
       </p:sp>
@@ -3434,6 +3436,253 @@
     <p:extLst>
       <p:ext uri="{BB962C8B-B14F-4D97-AF65-F5344CB8AC3E}">
         <p14:creationId xmlns:p14="http://schemas.microsoft.com/office/powerpoint/2010/main" val="782505501"/>
+      </p:ext>
+    </p:extLst>
+  </p:cSld>
+  <p:clrMapOvr>
+    <a:masterClrMapping/>
+  </p:clrMapOvr>
+</p:sld>
+</file>
+
+<file path=ppt/slides/slide2.xml><?xml version="1.0" encoding="utf-8"?>
+<p:sld xmlns:a="http://schemas.openxmlformats.org/drawingml/2006/main" xmlns:r="http://schemas.openxmlformats.org/officeDocument/2006/relationships" xmlns:p="http://schemas.openxmlformats.org/presentationml/2006/main">
+  <p:cSld>
+    <p:spTree>
+      <p:nvGrpSpPr>
+        <p:cNvPr id="1" name=""/>
+        <p:cNvGrpSpPr/>
+        <p:nvPr/>
+      </p:nvGrpSpPr>
+      <p:grpSpPr>
+        <a:xfrm>
+          <a:off x="0" y="0"/>
+          <a:ext cx="0" cy="0"/>
+          <a:chOff x="0" y="0"/>
+          <a:chExt cx="0" cy="0"/>
+        </a:xfrm>
+      </p:grpSpPr>
+      <p:sp>
+        <p:nvSpPr>
+          <p:cNvPr id="2" name="Title 1">
+            <a:extLst>
+              <a:ext uri="{FF2B5EF4-FFF2-40B4-BE49-F238E27FC236}">
+                <a16:creationId xmlns:a16="http://schemas.microsoft.com/office/drawing/2014/main" id="{2A4C27D9-2CC8-8031-C7B6-F6A3699502C1}"/>
+              </a:ext>
+            </a:extLst>
+          </p:cNvPr>
+          <p:cNvSpPr>
+            <a:spLocks noGrp="1"/>
+          </p:cNvSpPr>
+          <p:nvPr>
+            <p:ph type="title"/>
+          </p:nvPr>
+        </p:nvSpPr>
+        <p:spPr/>
+        <p:txBody>
+          <a:bodyPr/>
+          <a:lstStyle/>
+          <a:p>
+            <a:r>
+              <a:rPr lang="en-US" dirty="0"/>
+              <a:t>Storyline rollout</a:t>
+            </a:r>
+          </a:p>
+        </p:txBody>
+      </p:sp>
+      <p:sp>
+        <p:nvSpPr>
+          <p:cNvPr id="3" name="Content Placeholder 2">
+            <a:extLst>
+              <a:ext uri="{FF2B5EF4-FFF2-40B4-BE49-F238E27FC236}">
+                <a16:creationId xmlns:a16="http://schemas.microsoft.com/office/drawing/2014/main" id="{238B10BC-E776-A2DD-7AA4-931F3D036CF6}"/>
+              </a:ext>
+            </a:extLst>
+          </p:cNvPr>
+          <p:cNvSpPr>
+            <a:spLocks noGrp="1"/>
+          </p:cNvSpPr>
+          <p:nvPr>
+            <p:ph idx="1"/>
+          </p:nvPr>
+        </p:nvSpPr>
+        <p:spPr/>
+        <p:txBody>
+          <a:bodyPr/>
+          <a:lstStyle/>
+          <a:p>
+            <a:r>
+              <a:rPr lang="en-US" dirty="0"/>
+              <a:t>Currently on the books</a:t>
+            </a:r>
+          </a:p>
+          <a:p>
+            <a:r>
+              <a:rPr lang="en-US" dirty="0"/>
+              <a:t>Maximum resources</a:t>
+            </a:r>
+          </a:p>
+          <a:p>
+            <a:r>
+              <a:rPr lang="en-US" dirty="0"/>
+              <a:t>Proportional</a:t>
+            </a:r>
+          </a:p>
+          <a:p>
+            <a:r>
+              <a:rPr lang="en-US" dirty="0"/>
+              <a:t>Descriptor plots (comparison)</a:t>
+            </a:r>
+          </a:p>
+          <a:p>
+            <a:pPr lvl="1"/>
+            <a:r>
+              <a:rPr lang="en-US" dirty="0"/>
+              <a:t>Electricity on the Y axis is fuels (MJ)</a:t>
+            </a:r>
+          </a:p>
+          <a:p>
+            <a:pPr lvl="1"/>
+            <a:r>
+              <a:rPr lang="en-US" dirty="0"/>
+              <a:t>% land use vs % bioenergy feedstock</a:t>
+            </a:r>
+          </a:p>
+          <a:p>
+            <a:r>
+              <a:rPr lang="en-US" dirty="0"/>
+              <a:t>Outcome comparison</a:t>
+            </a:r>
+          </a:p>
+          <a:p>
+            <a:pPr lvl="1"/>
+            <a:r>
+              <a:rPr lang="en-US" dirty="0"/>
+              <a:t>Land use vs. jobs</a:t>
+            </a:r>
+          </a:p>
+          <a:p>
+            <a:pPr lvl="1"/>
+            <a:r>
+              <a:rPr lang="en-US" dirty="0"/>
+              <a:t>Water vs. jobs</a:t>
+            </a:r>
+          </a:p>
+          <a:p>
+            <a:endParaRPr lang="en-US" dirty="0"/>
+          </a:p>
+        </p:txBody>
+      </p:sp>
+    </p:spTree>
+    <p:extLst>
+      <p:ext uri="{BB962C8B-B14F-4D97-AF65-F5344CB8AC3E}">
+        <p14:creationId xmlns:p14="http://schemas.microsoft.com/office/powerpoint/2010/main" val="3798006383"/>
+      </p:ext>
+    </p:extLst>
+  </p:cSld>
+  <p:clrMapOvr>
+    <a:masterClrMapping/>
+  </p:clrMapOvr>
+</p:sld>
+</file>
+
+<file path=ppt/slides/slide3.xml><?xml version="1.0" encoding="utf-8"?>
+<p:sld xmlns:a="http://schemas.openxmlformats.org/drawingml/2006/main" xmlns:r="http://schemas.openxmlformats.org/officeDocument/2006/relationships" xmlns:p="http://schemas.openxmlformats.org/presentationml/2006/main">
+  <p:cSld>
+    <p:spTree>
+      <p:nvGrpSpPr>
+        <p:cNvPr id="1" name=""/>
+        <p:cNvGrpSpPr/>
+        <p:nvPr/>
+      </p:nvGrpSpPr>
+      <p:grpSpPr>
+        <a:xfrm>
+          <a:off x="0" y="0"/>
+          <a:ext cx="0" cy="0"/>
+          <a:chOff x="0" y="0"/>
+          <a:chExt cx="0" cy="0"/>
+        </a:xfrm>
+      </p:grpSpPr>
+      <p:sp>
+        <p:nvSpPr>
+          <p:cNvPr id="2" name="Title 1">
+            <a:extLst>
+              <a:ext uri="{FF2B5EF4-FFF2-40B4-BE49-F238E27FC236}">
+                <a16:creationId xmlns:a16="http://schemas.microsoft.com/office/drawing/2014/main" id="{DB5539AC-BE32-4B02-0AC3-23DD39C8B0F2}"/>
+              </a:ext>
+            </a:extLst>
+          </p:cNvPr>
+          <p:cNvSpPr>
+            <a:spLocks noGrp="1"/>
+          </p:cNvSpPr>
+          <p:nvPr>
+            <p:ph type="title"/>
+          </p:nvPr>
+        </p:nvSpPr>
+        <p:spPr/>
+        <p:txBody>
+          <a:bodyPr/>
+          <a:lstStyle/>
+          <a:p>
+            <a:r>
+              <a:rPr lang="en-US" dirty="0"/>
+              <a:t>Question</a:t>
+            </a:r>
+          </a:p>
+        </p:txBody>
+      </p:sp>
+      <p:sp>
+        <p:nvSpPr>
+          <p:cNvPr id="3" name="Content Placeholder 2">
+            <a:extLst>
+              <a:ext uri="{FF2B5EF4-FFF2-40B4-BE49-F238E27FC236}">
+                <a16:creationId xmlns:a16="http://schemas.microsoft.com/office/drawing/2014/main" id="{7492A5FE-17F6-711D-2DF0-B7BF20CE48DF}"/>
+              </a:ext>
+            </a:extLst>
+          </p:cNvPr>
+          <p:cNvSpPr>
+            <a:spLocks noGrp="1"/>
+          </p:cNvSpPr>
+          <p:nvPr>
+            <p:ph idx="1"/>
+          </p:nvPr>
+        </p:nvSpPr>
+        <p:spPr/>
+        <p:txBody>
+          <a:bodyPr/>
+          <a:lstStyle/>
+          <a:p>
+            <a:r>
+              <a:rPr lang="en-US" dirty="0"/>
+              <a:t>What is the real job split? Is it really electrons vs. molecules or…</a:t>
+            </a:r>
+          </a:p>
+          <a:p>
+            <a:pPr lvl="1"/>
+            <a:r>
+              <a:rPr lang="en-US" dirty="0"/>
+              <a:t>Feedstock (land vs. wood/manure)</a:t>
+            </a:r>
+          </a:p>
+          <a:p>
+            <a:pPr lvl="1"/>
+            <a:r>
+              <a:rPr lang="en-US" dirty="0"/>
+              <a:t>Technology (combustion vs. pyrolysis, etc.)</a:t>
+            </a:r>
+          </a:p>
+          <a:p>
+            <a:r>
+              <a:rPr lang="en-US" dirty="0"/>
+              <a:t>Steady state jobs</a:t>
+            </a:r>
+          </a:p>
+        </p:txBody>
+      </p:sp>
+    </p:spTree>
+    <p:extLst>
+      <p:ext uri="{BB962C8B-B14F-4D97-AF65-F5344CB8AC3E}">
+        <p14:creationId xmlns:p14="http://schemas.microsoft.com/office/powerpoint/2010/main" val="3636807413"/>
       </p:ext>
     </p:extLst>
   </p:cSld>

</xml_diff>